<commit_message>
checked in the updated formatted slides
</commit_message>
<xml_diff>
--- a/slides/WDB/WDB - Chapter 2.pptx
+++ b/slides/WDB/WDB - Chapter 2.pptx
@@ -2350,7 +2350,7 @@
           <a:p>
             <a:fld id="{9DEB306A-FE1C-4996-AB92-3C76DD2CBDB3}" type="datetimeFigureOut">
               <a:rPr lang="es-SV" smtClean="0"/>
-              <a:t>10/12/17</a:t>
+              <a:t>12/12/17</a:t>
             </a:fld>
             <a:endParaRPr lang="es-SV"/>
           </a:p>
@@ -2515,7 +2515,7 @@
           <a:p>
             <a:fld id="{01993A81-F12D-42C5-A35C-8AABE483B59D}" type="datetimeFigureOut">
               <a:rPr lang="es-MX" smtClean="0"/>
-              <a:t>10/12/17</a:t>
+              <a:t>12/12/17</a:t>
             </a:fld>
             <a:endParaRPr lang="es-MX"/>
           </a:p>

</xml_diff>